<commit_message>
Update Introducción a Data Warehousing - Presentación.pptx
</commit_message>
<xml_diff>
--- a/informe - presentación/Introducción a Data Warehousing - Presentación.pptx
+++ b/informe - presentación/Introducción a Data Warehousing - Presentación.pptx
@@ -10,7 +10,7 @@
   <p:sldIdLst>
     <p:sldId id="256" r:id="rId2"/>
     <p:sldId id="270" r:id="rId3"/>
-    <p:sldId id="271" r:id="rId4"/>
+    <p:sldId id="272" r:id="rId4"/>
     <p:sldId id="257" r:id="rId5"/>
     <p:sldId id="263" r:id="rId6"/>
   </p:sldIdLst>
@@ -953,110 +953,6 @@
   <p:cSld>
     <p:spTree>
       <p:nvGrpSpPr>
-        <p:cNvPr id="1" name="Shape 362"/>
-        <p:cNvGrpSpPr/>
-        <p:nvPr/>
-      </p:nvGrpSpPr>
-      <p:grpSpPr>
-        <a:xfrm>
-          <a:off x="0" y="0"/>
-          <a:ext cx="0" cy="0"/>
-          <a:chOff x="0" y="0"/>
-          <a:chExt cx="0" cy="0"/>
-        </a:xfrm>
-      </p:grpSpPr>
-      <p:sp>
-        <p:nvSpPr>
-          <p:cNvPr id="363" name="Google Shape;363;g2a5868fc0f2_0_10:notes"/>
-          <p:cNvSpPr>
-            <a:spLocks noGrp="1" noRot="1" noChangeAspect="1"/>
-          </p:cNvSpPr>
-          <p:nvPr>
-            <p:ph type="sldImg" idx="2"/>
-          </p:nvPr>
-        </p:nvSpPr>
-        <p:spPr>
-          <a:xfrm>
-            <a:off x="381000" y="685800"/>
-            <a:ext cx="6096000" cy="3429000"/>
-          </a:xfrm>
-          <a:custGeom>
-            <a:avLst/>
-            <a:gdLst/>
-            <a:ahLst/>
-            <a:cxnLst/>
-            <a:rect l="l" t="t" r="r" b="b"/>
-            <a:pathLst>
-              <a:path w="120000" h="120000" extrusionOk="0">
-                <a:moveTo>
-                  <a:pt x="0" y="0"/>
-                </a:moveTo>
-                <a:lnTo>
-                  <a:pt x="120000" y="0"/>
-                </a:lnTo>
-                <a:lnTo>
-                  <a:pt x="120000" y="120000"/>
-                </a:lnTo>
-                <a:lnTo>
-                  <a:pt x="0" y="120000"/>
-                </a:lnTo>
-                <a:close/>
-              </a:path>
-            </a:pathLst>
-          </a:custGeom>
-        </p:spPr>
-      </p:sp>
-      <p:sp>
-        <p:nvSpPr>
-          <p:cNvPr id="364" name="Google Shape;364;g2a5868fc0f2_0_10:notes"/>
-          <p:cNvSpPr txBox="1">
-            <a:spLocks noGrp="1"/>
-          </p:cNvSpPr>
-          <p:nvPr>
-            <p:ph type="body" idx="1"/>
-          </p:nvPr>
-        </p:nvSpPr>
-        <p:spPr>
-          <a:xfrm>
-            <a:off x="685800" y="4343400"/>
-            <a:ext cx="5486400" cy="4114800"/>
-          </a:xfrm>
-          <a:prstGeom prst="rect">
-            <a:avLst/>
-          </a:prstGeom>
-        </p:spPr>
-        <p:txBody>
-          <a:bodyPr spcFirstLastPara="1" wrap="square" lIns="91425" tIns="91425" rIns="91425" bIns="91425" anchor="t" anchorCtr="0">
-            <a:noAutofit/>
-          </a:bodyPr>
-          <a:lstStyle/>
-          <a:p>
-            <a:pPr marL="0" lvl="0" indent="0" algn="l" rtl="0">
-              <a:spcBef>
-                <a:spcPts val="0"/>
-              </a:spcBef>
-              <a:spcAft>
-                <a:spcPts val="0"/>
-              </a:spcAft>
-              <a:buNone/>
-            </a:pPr>
-            <a:endParaRPr/>
-          </a:p>
-        </p:txBody>
-      </p:sp>
-    </p:spTree>
-  </p:cSld>
-  <p:clrMapOvr>
-    <a:masterClrMapping/>
-  </p:clrMapOvr>
-</p:notes>
-</file>
-
-<file path=ppt/notesSlides/notesSlide4.xml><?xml version="1.0" encoding="utf-8"?>
-<p:notes xmlns:a="http://schemas.openxmlformats.org/drawingml/2006/main" xmlns:r="http://schemas.openxmlformats.org/officeDocument/2006/relationships" xmlns:p="http://schemas.openxmlformats.org/presentationml/2006/main" showMasterSp="0" showMasterPhAnim="0">
-  <p:cSld>
-    <p:spTree>
-      <p:nvGrpSpPr>
         <p:cNvPr id="1" name="Shape 70"/>
         <p:cNvGrpSpPr/>
         <p:nvPr/>
@@ -1156,7 +1052,7 @@
 </p:notes>
 </file>
 
-<file path=ppt/notesSlides/notesSlide5.xml><?xml version="1.0" encoding="utf-8"?>
+<file path=ppt/notesSlides/notesSlide4.xml><?xml version="1.0" encoding="utf-8"?>
 <p:notes xmlns:a="http://schemas.openxmlformats.org/drawingml/2006/main" xmlns:r="http://schemas.openxmlformats.org/officeDocument/2006/relationships" xmlns:p="http://schemas.openxmlformats.org/presentationml/2006/main" showMasterSp="0" showMasterPhAnim="0">
   <p:cSld>
     <p:spTree>
@@ -6821,7 +6717,7 @@
   <p:cSld>
     <p:spTree>
       <p:nvGrpSpPr>
-        <p:cNvPr id="1" name="Shape 365"/>
+        <p:cNvPr id="1" name=""/>
         <p:cNvGrpSpPr/>
         <p:nvPr/>
       </p:nvGrpSpPr>
@@ -6835,7 +6731,13 @@
       </p:grpSpPr>
       <p:sp>
         <p:nvSpPr>
-          <p:cNvPr id="366" name="Google Shape;366;p23"/>
+          <p:cNvPr id="5" name="Google Shape;366;p23">
+            <a:extLst>
+              <a:ext uri="{FF2B5EF4-FFF2-40B4-BE49-F238E27FC236}">
+                <a16:creationId xmlns:a16="http://schemas.microsoft.com/office/drawing/2014/main" id="{4733F7E3-98A7-CB2C-F20B-2AF8D772F24F}"/>
+              </a:ext>
+            </a:extLst>
+          </p:cNvPr>
           <p:cNvSpPr txBox="1">
             <a:spLocks noGrp="1"/>
           </p:cNvSpPr>
@@ -6885,7 +6787,13 @@
       </p:sp>
       <p:cxnSp>
         <p:nvCxnSpPr>
-          <p:cNvPr id="368" name="Google Shape;368;p23"/>
+          <p:cNvPr id="6" name="Google Shape;368;p23">
+            <a:extLst>
+              <a:ext uri="{FF2B5EF4-FFF2-40B4-BE49-F238E27FC236}">
+                <a16:creationId xmlns:a16="http://schemas.microsoft.com/office/drawing/2014/main" id="{29B094CF-84B1-E22B-1C9A-CC1E8C822030}"/>
+              </a:ext>
+            </a:extLst>
+          </p:cNvPr>
           <p:cNvCxnSpPr/>
           <p:nvPr/>
         </p:nvCxnSpPr>
@@ -6911,7 +6819,13 @@
       </p:cxnSp>
       <p:sp>
         <p:nvSpPr>
-          <p:cNvPr id="369" name="Google Shape;369;p23"/>
+          <p:cNvPr id="7" name="Google Shape;369;p23">
+            <a:extLst>
+              <a:ext uri="{FF2B5EF4-FFF2-40B4-BE49-F238E27FC236}">
+                <a16:creationId xmlns:a16="http://schemas.microsoft.com/office/drawing/2014/main" id="{F2C5D20F-0CF7-A568-8DAF-3B14AD81F8F9}"/>
+              </a:ext>
+            </a:extLst>
+          </p:cNvPr>
           <p:cNvSpPr/>
           <p:nvPr/>
         </p:nvSpPr>
@@ -6965,7 +6879,13 @@
       </p:sp>
       <p:sp>
         <p:nvSpPr>
-          <p:cNvPr id="370" name="Google Shape;370;p23"/>
+          <p:cNvPr id="8" name="Google Shape;370;p23">
+            <a:extLst>
+              <a:ext uri="{FF2B5EF4-FFF2-40B4-BE49-F238E27FC236}">
+                <a16:creationId xmlns:a16="http://schemas.microsoft.com/office/drawing/2014/main" id="{859F9300-30B0-F357-C87C-B1B72BA67C3E}"/>
+              </a:ext>
+            </a:extLst>
+          </p:cNvPr>
           <p:cNvSpPr/>
           <p:nvPr/>
         </p:nvSpPr>
@@ -7019,7 +6939,13 @@
       </p:sp>
       <p:sp>
         <p:nvSpPr>
-          <p:cNvPr id="371" name="Google Shape;371;p23"/>
+          <p:cNvPr id="9" name="Google Shape;371;p23">
+            <a:extLst>
+              <a:ext uri="{FF2B5EF4-FFF2-40B4-BE49-F238E27FC236}">
+                <a16:creationId xmlns:a16="http://schemas.microsoft.com/office/drawing/2014/main" id="{E20074CC-429F-F5B4-E509-77C161DAE8F0}"/>
+              </a:ext>
+            </a:extLst>
+          </p:cNvPr>
           <p:cNvSpPr/>
           <p:nvPr/>
         </p:nvSpPr>
@@ -7073,7 +6999,13 @@
       </p:sp>
       <p:sp>
         <p:nvSpPr>
-          <p:cNvPr id="372" name="Google Shape;372;p23"/>
+          <p:cNvPr id="10" name="Google Shape;372;p23">
+            <a:extLst>
+              <a:ext uri="{FF2B5EF4-FFF2-40B4-BE49-F238E27FC236}">
+                <a16:creationId xmlns:a16="http://schemas.microsoft.com/office/drawing/2014/main" id="{B94B8137-034D-05D3-3E3C-6FDA1A992654}"/>
+              </a:ext>
+            </a:extLst>
+          </p:cNvPr>
           <p:cNvSpPr/>
           <p:nvPr/>
         </p:nvSpPr>
@@ -7127,7 +7059,13 @@
       </p:sp>
       <p:sp>
         <p:nvSpPr>
-          <p:cNvPr id="373" name="Google Shape;373;p23"/>
+          <p:cNvPr id="11" name="Google Shape;373;p23">
+            <a:extLst>
+              <a:ext uri="{FF2B5EF4-FFF2-40B4-BE49-F238E27FC236}">
+                <a16:creationId xmlns:a16="http://schemas.microsoft.com/office/drawing/2014/main" id="{0E9691BF-37E3-627F-194D-3F6482F9C85E}"/>
+              </a:ext>
+            </a:extLst>
+          </p:cNvPr>
           <p:cNvSpPr/>
           <p:nvPr/>
         </p:nvSpPr>
@@ -7181,7 +7119,13 @@
       </p:sp>
       <p:sp>
         <p:nvSpPr>
-          <p:cNvPr id="374" name="Google Shape;374;p23"/>
+          <p:cNvPr id="12" name="Google Shape;374;p23">
+            <a:extLst>
+              <a:ext uri="{FF2B5EF4-FFF2-40B4-BE49-F238E27FC236}">
+                <a16:creationId xmlns:a16="http://schemas.microsoft.com/office/drawing/2014/main" id="{DBC4383A-B347-1EE2-2B44-C55A4CAB6736}"/>
+              </a:ext>
+            </a:extLst>
+          </p:cNvPr>
           <p:cNvSpPr txBox="1"/>
           <p:nvPr/>
         </p:nvSpPr>
@@ -7239,7 +7183,13 @@
       </p:sp>
       <p:sp>
         <p:nvSpPr>
-          <p:cNvPr id="375" name="Google Shape;375;p23"/>
+          <p:cNvPr id="13" name="Google Shape;375;p23">
+            <a:extLst>
+              <a:ext uri="{FF2B5EF4-FFF2-40B4-BE49-F238E27FC236}">
+                <a16:creationId xmlns:a16="http://schemas.microsoft.com/office/drawing/2014/main" id="{DBF82953-149E-3B0F-B874-B40603AF1EF4}"/>
+              </a:ext>
+            </a:extLst>
+          </p:cNvPr>
           <p:cNvSpPr txBox="1"/>
           <p:nvPr/>
         </p:nvSpPr>
@@ -7309,7 +7259,13 @@
       </p:sp>
       <p:sp>
         <p:nvSpPr>
-          <p:cNvPr id="376" name="Google Shape;376;p23"/>
+          <p:cNvPr id="14" name="Google Shape;376;p23">
+            <a:extLst>
+              <a:ext uri="{FF2B5EF4-FFF2-40B4-BE49-F238E27FC236}">
+                <a16:creationId xmlns:a16="http://schemas.microsoft.com/office/drawing/2014/main" id="{1D0C2276-62EB-EA82-59D5-3A8C4355193A}"/>
+              </a:ext>
+            </a:extLst>
+          </p:cNvPr>
           <p:cNvSpPr txBox="1"/>
           <p:nvPr/>
         </p:nvSpPr>
@@ -7438,7 +7394,13 @@
       </p:sp>
       <p:sp>
         <p:nvSpPr>
-          <p:cNvPr id="377" name="Google Shape;377;p23"/>
+          <p:cNvPr id="15" name="Google Shape;377;p23">
+            <a:extLst>
+              <a:ext uri="{FF2B5EF4-FFF2-40B4-BE49-F238E27FC236}">
+                <a16:creationId xmlns:a16="http://schemas.microsoft.com/office/drawing/2014/main" id="{EBE2E369-B588-97BB-7D34-DC808C57F6DD}"/>
+              </a:ext>
+            </a:extLst>
+          </p:cNvPr>
           <p:cNvSpPr txBox="1"/>
           <p:nvPr/>
         </p:nvSpPr>
@@ -7496,7 +7458,13 @@
       </p:sp>
       <p:sp>
         <p:nvSpPr>
-          <p:cNvPr id="378" name="Google Shape;378;p23"/>
+          <p:cNvPr id="16" name="Google Shape;378;p23">
+            <a:extLst>
+              <a:ext uri="{FF2B5EF4-FFF2-40B4-BE49-F238E27FC236}">
+                <a16:creationId xmlns:a16="http://schemas.microsoft.com/office/drawing/2014/main" id="{6DB165E0-3FFB-C472-21D6-1752B35CD1EA}"/>
+              </a:ext>
+            </a:extLst>
+          </p:cNvPr>
           <p:cNvSpPr/>
           <p:nvPr/>
         </p:nvSpPr>
@@ -7541,10 +7509,16 @@
       </p:sp>
       <p:cxnSp>
         <p:nvCxnSpPr>
-          <p:cNvPr id="379" name="Google Shape;379;p23"/>
+          <p:cNvPr id="17" name="Google Shape;379;p23">
+            <a:extLst>
+              <a:ext uri="{FF2B5EF4-FFF2-40B4-BE49-F238E27FC236}">
+                <a16:creationId xmlns:a16="http://schemas.microsoft.com/office/drawing/2014/main" id="{A796D723-C43D-2A28-1CBB-A498EF579912}"/>
+              </a:ext>
+            </a:extLst>
+          </p:cNvPr>
           <p:cNvCxnSpPr>
-            <a:stCxn id="378" idx="6"/>
-            <a:endCxn id="369" idx="2"/>
+            <a:stCxn id="16" idx="6"/>
+            <a:endCxn id="7" idx="2"/>
           </p:cNvCxnSpPr>
           <p:nvPr/>
         </p:nvCxnSpPr>
@@ -7570,7 +7544,13 @@
       </p:cxnSp>
       <p:sp>
         <p:nvSpPr>
-          <p:cNvPr id="380" name="Google Shape;380;p23"/>
+          <p:cNvPr id="18" name="Google Shape;380;p23">
+            <a:extLst>
+              <a:ext uri="{FF2B5EF4-FFF2-40B4-BE49-F238E27FC236}">
+                <a16:creationId xmlns:a16="http://schemas.microsoft.com/office/drawing/2014/main" id="{2D945674-4EF5-78BF-A18D-FF6CA3A3B439}"/>
+              </a:ext>
+            </a:extLst>
+          </p:cNvPr>
           <p:cNvSpPr/>
           <p:nvPr/>
         </p:nvSpPr>
@@ -7615,10 +7595,16 @@
       </p:sp>
       <p:cxnSp>
         <p:nvCxnSpPr>
-          <p:cNvPr id="381" name="Google Shape;381;p23"/>
+          <p:cNvPr id="19" name="Google Shape;381;p23">
+            <a:extLst>
+              <a:ext uri="{FF2B5EF4-FFF2-40B4-BE49-F238E27FC236}">
+                <a16:creationId xmlns:a16="http://schemas.microsoft.com/office/drawing/2014/main" id="{DF8B23B1-37B5-6E58-007D-28C7C47FE8D9}"/>
+              </a:ext>
+            </a:extLst>
+          </p:cNvPr>
           <p:cNvCxnSpPr>
-            <a:stCxn id="380" idx="6"/>
-            <a:endCxn id="371" idx="2"/>
+            <a:stCxn id="18" idx="6"/>
+            <a:endCxn id="9" idx="2"/>
           </p:cNvCxnSpPr>
           <p:nvPr/>
         </p:nvCxnSpPr>
@@ -7644,7 +7630,13 @@
       </p:cxnSp>
       <p:sp>
         <p:nvSpPr>
-          <p:cNvPr id="382" name="Google Shape;382;p23"/>
+          <p:cNvPr id="20" name="Google Shape;382;p23">
+            <a:extLst>
+              <a:ext uri="{FF2B5EF4-FFF2-40B4-BE49-F238E27FC236}">
+                <a16:creationId xmlns:a16="http://schemas.microsoft.com/office/drawing/2014/main" id="{A71B8C8D-1178-767A-DCFC-B5E73BD64D7B}"/>
+              </a:ext>
+            </a:extLst>
+          </p:cNvPr>
           <p:cNvSpPr txBox="1"/>
           <p:nvPr/>
         </p:nvSpPr>
@@ -7702,7 +7694,13 @@
       </p:sp>
       <p:sp>
         <p:nvSpPr>
-          <p:cNvPr id="383" name="Google Shape;383;p23"/>
+          <p:cNvPr id="21" name="Google Shape;383;p23">
+            <a:extLst>
+              <a:ext uri="{FF2B5EF4-FFF2-40B4-BE49-F238E27FC236}">
+                <a16:creationId xmlns:a16="http://schemas.microsoft.com/office/drawing/2014/main" id="{5E98D094-9FDC-50BF-60ED-169E8394BA76}"/>
+              </a:ext>
+            </a:extLst>
+          </p:cNvPr>
           <p:cNvSpPr txBox="1"/>
           <p:nvPr/>
         </p:nvSpPr>
@@ -7765,7 +7763,13 @@
       </p:sp>
       <p:sp>
         <p:nvSpPr>
-          <p:cNvPr id="384" name="Google Shape;384;p23"/>
+          <p:cNvPr id="22" name="Google Shape;384;p23">
+            <a:extLst>
+              <a:ext uri="{FF2B5EF4-FFF2-40B4-BE49-F238E27FC236}">
+                <a16:creationId xmlns:a16="http://schemas.microsoft.com/office/drawing/2014/main" id="{A9BF13A9-C46F-75C9-9AB3-1EB1CC4DF88E}"/>
+              </a:ext>
+            </a:extLst>
+          </p:cNvPr>
           <p:cNvSpPr/>
           <p:nvPr/>
         </p:nvSpPr>
@@ -7810,10 +7814,16 @@
       </p:sp>
       <p:cxnSp>
         <p:nvCxnSpPr>
-          <p:cNvPr id="385" name="Google Shape;385;p23"/>
+          <p:cNvPr id="23" name="Google Shape;385;p23">
+            <a:extLst>
+              <a:ext uri="{FF2B5EF4-FFF2-40B4-BE49-F238E27FC236}">
+                <a16:creationId xmlns:a16="http://schemas.microsoft.com/office/drawing/2014/main" id="{962FCFF7-4A7F-578E-9853-DC6EDF8F826F}"/>
+              </a:ext>
+            </a:extLst>
+          </p:cNvPr>
           <p:cNvCxnSpPr>
-            <a:stCxn id="384" idx="6"/>
-            <a:endCxn id="373" idx="2"/>
+            <a:stCxn id="22" idx="6"/>
+            <a:endCxn id="11" idx="2"/>
           </p:cNvCxnSpPr>
           <p:nvPr/>
         </p:nvCxnSpPr>
@@ -7839,7 +7849,13 @@
       </p:cxnSp>
       <p:sp>
         <p:nvSpPr>
-          <p:cNvPr id="386" name="Google Shape;386;p23"/>
+          <p:cNvPr id="24" name="Google Shape;386;p23">
+            <a:extLst>
+              <a:ext uri="{FF2B5EF4-FFF2-40B4-BE49-F238E27FC236}">
+                <a16:creationId xmlns:a16="http://schemas.microsoft.com/office/drawing/2014/main" id="{D9711333-A6AA-421A-708D-C2984C8C348A}"/>
+              </a:ext>
+            </a:extLst>
+          </p:cNvPr>
           <p:cNvSpPr txBox="1"/>
           <p:nvPr/>
         </p:nvSpPr>
@@ -8089,7 +8105,13 @@
       </p:sp>
       <p:sp>
         <p:nvSpPr>
-          <p:cNvPr id="387" name="Google Shape;387;p23"/>
+          <p:cNvPr id="25" name="Google Shape;387;p23">
+            <a:extLst>
+              <a:ext uri="{FF2B5EF4-FFF2-40B4-BE49-F238E27FC236}">
+                <a16:creationId xmlns:a16="http://schemas.microsoft.com/office/drawing/2014/main" id="{0B7BE0F9-999A-FFA5-DF9C-EF49F8365953}"/>
+              </a:ext>
+            </a:extLst>
+          </p:cNvPr>
           <p:cNvSpPr txBox="1"/>
           <p:nvPr/>
         </p:nvSpPr>
@@ -8147,7 +8169,13 @@
       </p:sp>
       <p:sp>
         <p:nvSpPr>
-          <p:cNvPr id="388" name="Google Shape;388;p23"/>
+          <p:cNvPr id="26" name="Google Shape;388;p23">
+            <a:extLst>
+              <a:ext uri="{FF2B5EF4-FFF2-40B4-BE49-F238E27FC236}">
+                <a16:creationId xmlns:a16="http://schemas.microsoft.com/office/drawing/2014/main" id="{B14B939D-6C69-CC43-5EF4-73E8C88907A7}"/>
+              </a:ext>
+            </a:extLst>
+          </p:cNvPr>
           <p:cNvSpPr/>
           <p:nvPr/>
         </p:nvSpPr>
@@ -8192,10 +8220,16 @@
       </p:sp>
       <p:cxnSp>
         <p:nvCxnSpPr>
-          <p:cNvPr id="389" name="Google Shape;389;p23"/>
+          <p:cNvPr id="27" name="Google Shape;389;p23">
+            <a:extLst>
+              <a:ext uri="{FF2B5EF4-FFF2-40B4-BE49-F238E27FC236}">
+                <a16:creationId xmlns:a16="http://schemas.microsoft.com/office/drawing/2014/main" id="{6B3E21E2-5CCF-884C-1C65-7E2844F0EB8C}"/>
+              </a:ext>
+            </a:extLst>
+          </p:cNvPr>
           <p:cNvCxnSpPr>
-            <a:stCxn id="388" idx="6"/>
-            <a:endCxn id="370" idx="6"/>
+            <a:stCxn id="26" idx="6"/>
+            <a:endCxn id="8" idx="6"/>
           </p:cNvCxnSpPr>
           <p:nvPr/>
         </p:nvCxnSpPr>
@@ -8221,7 +8255,13 @@
       </p:cxnSp>
       <p:sp>
         <p:nvSpPr>
-          <p:cNvPr id="390" name="Google Shape;390;p23"/>
+          <p:cNvPr id="28" name="Google Shape;390;p23">
+            <a:extLst>
+              <a:ext uri="{FF2B5EF4-FFF2-40B4-BE49-F238E27FC236}">
+                <a16:creationId xmlns:a16="http://schemas.microsoft.com/office/drawing/2014/main" id="{979B9D0D-B16A-D6A9-8577-33437F0967ED}"/>
+              </a:ext>
+            </a:extLst>
+          </p:cNvPr>
           <p:cNvSpPr txBox="1"/>
           <p:nvPr/>
         </p:nvSpPr>
@@ -8279,7 +8319,13 @@
       </p:sp>
       <p:sp>
         <p:nvSpPr>
-          <p:cNvPr id="391" name="Google Shape;391;p23"/>
+          <p:cNvPr id="29" name="Google Shape;391;p23">
+            <a:extLst>
+              <a:ext uri="{FF2B5EF4-FFF2-40B4-BE49-F238E27FC236}">
+                <a16:creationId xmlns:a16="http://schemas.microsoft.com/office/drawing/2014/main" id="{0C8DAB21-0EA4-97FC-E5CE-1930B5FF2005}"/>
+              </a:ext>
+            </a:extLst>
+          </p:cNvPr>
           <p:cNvSpPr txBox="1"/>
           <p:nvPr/>
         </p:nvSpPr>
@@ -8410,7 +8456,13 @@
       </p:sp>
       <p:sp>
         <p:nvSpPr>
-          <p:cNvPr id="392" name="Google Shape;392;p23"/>
+          <p:cNvPr id="30" name="Google Shape;392;p23">
+            <a:extLst>
+              <a:ext uri="{FF2B5EF4-FFF2-40B4-BE49-F238E27FC236}">
+                <a16:creationId xmlns:a16="http://schemas.microsoft.com/office/drawing/2014/main" id="{7EE229D6-8254-3ECE-8BEA-4730786FE2BA}"/>
+              </a:ext>
+            </a:extLst>
+          </p:cNvPr>
           <p:cNvSpPr/>
           <p:nvPr/>
         </p:nvSpPr>
@@ -8455,10 +8507,16 @@
       </p:sp>
       <p:cxnSp>
         <p:nvCxnSpPr>
-          <p:cNvPr id="393" name="Google Shape;393;p23"/>
+          <p:cNvPr id="31" name="Google Shape;393;p23">
+            <a:extLst>
+              <a:ext uri="{FF2B5EF4-FFF2-40B4-BE49-F238E27FC236}">
+                <a16:creationId xmlns:a16="http://schemas.microsoft.com/office/drawing/2014/main" id="{09254007-2384-F3C1-0EEC-DC71C0451861}"/>
+              </a:ext>
+            </a:extLst>
+          </p:cNvPr>
           <p:cNvCxnSpPr>
-            <a:stCxn id="392" idx="6"/>
-            <a:endCxn id="372" idx="6"/>
+            <a:stCxn id="30" idx="6"/>
+            <a:endCxn id="10" idx="6"/>
           </p:cNvCxnSpPr>
           <p:nvPr/>
         </p:nvCxnSpPr>
@@ -8484,7 +8542,13 @@
       </p:cxnSp>
       <p:grpSp>
         <p:nvGrpSpPr>
-          <p:cNvPr id="394" name="Google Shape;394;p23"/>
+          <p:cNvPr id="32" name="Google Shape;394;p23">
+            <a:extLst>
+              <a:ext uri="{FF2B5EF4-FFF2-40B4-BE49-F238E27FC236}">
+                <a16:creationId xmlns:a16="http://schemas.microsoft.com/office/drawing/2014/main" id="{3C6E3889-539C-2BD1-A135-A13482DA1F70}"/>
+              </a:ext>
+            </a:extLst>
+          </p:cNvPr>
           <p:cNvGrpSpPr/>
           <p:nvPr/>
         </p:nvGrpSpPr>
@@ -8498,7 +8562,13 @@
         </p:grpSpPr>
         <p:sp>
           <p:nvSpPr>
-            <p:cNvPr id="395" name="Google Shape;395;p23"/>
+            <p:cNvPr id="33" name="Google Shape;395;p23">
+              <a:extLst>
+                <a:ext uri="{FF2B5EF4-FFF2-40B4-BE49-F238E27FC236}">
+                  <a16:creationId xmlns:a16="http://schemas.microsoft.com/office/drawing/2014/main" id="{A2CE69C7-1699-2CBF-7666-12696D64A4DE}"/>
+                </a:ext>
+              </a:extLst>
+            </p:cNvPr>
             <p:cNvSpPr/>
             <p:nvPr/>
           </p:nvSpPr>
@@ -8819,7 +8889,13 @@
         </p:sp>
         <p:sp>
           <p:nvSpPr>
-            <p:cNvPr id="396" name="Google Shape;396;p23"/>
+            <p:cNvPr id="34" name="Google Shape;396;p23">
+              <a:extLst>
+                <a:ext uri="{FF2B5EF4-FFF2-40B4-BE49-F238E27FC236}">
+                  <a16:creationId xmlns:a16="http://schemas.microsoft.com/office/drawing/2014/main" id="{AF0D9554-A917-CF4C-8A48-20CA0A03F3D0}"/>
+                </a:ext>
+              </a:extLst>
+            </p:cNvPr>
             <p:cNvSpPr/>
             <p:nvPr/>
           </p:nvSpPr>
@@ -8958,7 +9034,13 @@
         </p:sp>
         <p:sp>
           <p:nvSpPr>
-            <p:cNvPr id="397" name="Google Shape;397;p23"/>
+            <p:cNvPr id="35" name="Google Shape;397;p23">
+              <a:extLst>
+                <a:ext uri="{FF2B5EF4-FFF2-40B4-BE49-F238E27FC236}">
+                  <a16:creationId xmlns:a16="http://schemas.microsoft.com/office/drawing/2014/main" id="{68B5BEE1-9761-20B0-1C2E-825BB88BD9C8}"/>
+                </a:ext>
+              </a:extLst>
+            </p:cNvPr>
             <p:cNvSpPr/>
             <p:nvPr/>
           </p:nvSpPr>
@@ -9107,7 +9189,13 @@
       </p:grpSp>
       <p:grpSp>
         <p:nvGrpSpPr>
-          <p:cNvPr id="398" name="Google Shape;398;p23"/>
+          <p:cNvPr id="36" name="Google Shape;398;p23">
+            <a:extLst>
+              <a:ext uri="{FF2B5EF4-FFF2-40B4-BE49-F238E27FC236}">
+                <a16:creationId xmlns:a16="http://schemas.microsoft.com/office/drawing/2014/main" id="{B51E1B28-A97F-E6AB-8DF7-F02B35B651DF}"/>
+              </a:ext>
+            </a:extLst>
+          </p:cNvPr>
           <p:cNvGrpSpPr/>
           <p:nvPr/>
         </p:nvGrpSpPr>
@@ -9121,7 +9209,13 @@
         </p:grpSpPr>
         <p:sp>
           <p:nvSpPr>
-            <p:cNvPr id="399" name="Google Shape;399;p23"/>
+            <p:cNvPr id="37" name="Google Shape;399;p23">
+              <a:extLst>
+                <a:ext uri="{FF2B5EF4-FFF2-40B4-BE49-F238E27FC236}">
+                  <a16:creationId xmlns:a16="http://schemas.microsoft.com/office/drawing/2014/main" id="{11BBA0C6-1F80-1DA9-D50B-0EFA5DCF081F}"/>
+                </a:ext>
+              </a:extLst>
+            </p:cNvPr>
             <p:cNvSpPr/>
             <p:nvPr/>
           </p:nvSpPr>
@@ -9203,7 +9297,13 @@
         </p:sp>
         <p:sp>
           <p:nvSpPr>
-            <p:cNvPr id="400" name="Google Shape;400;p23"/>
+            <p:cNvPr id="38" name="Google Shape;400;p23">
+              <a:extLst>
+                <a:ext uri="{FF2B5EF4-FFF2-40B4-BE49-F238E27FC236}">
+                  <a16:creationId xmlns:a16="http://schemas.microsoft.com/office/drawing/2014/main" id="{BA8294AB-DC5E-45B5-B922-D32B3CE34E04}"/>
+                </a:ext>
+              </a:extLst>
+            </p:cNvPr>
             <p:cNvSpPr/>
             <p:nvPr/>
           </p:nvSpPr>
@@ -9285,7 +9385,13 @@
         </p:sp>
         <p:sp>
           <p:nvSpPr>
-            <p:cNvPr id="401" name="Google Shape;401;p23"/>
+            <p:cNvPr id="39" name="Google Shape;401;p23">
+              <a:extLst>
+                <a:ext uri="{FF2B5EF4-FFF2-40B4-BE49-F238E27FC236}">
+                  <a16:creationId xmlns:a16="http://schemas.microsoft.com/office/drawing/2014/main" id="{87317ABF-741A-CD16-A355-2C80C1ACA854}"/>
+                </a:ext>
+              </a:extLst>
+            </p:cNvPr>
             <p:cNvSpPr/>
             <p:nvPr/>
           </p:nvSpPr>
@@ -9365,7 +9471,13 @@
         </p:sp>
         <p:sp>
           <p:nvSpPr>
-            <p:cNvPr id="402" name="Google Shape;402;p23"/>
+            <p:cNvPr id="40" name="Google Shape;402;p23">
+              <a:extLst>
+                <a:ext uri="{FF2B5EF4-FFF2-40B4-BE49-F238E27FC236}">
+                  <a16:creationId xmlns:a16="http://schemas.microsoft.com/office/drawing/2014/main" id="{0A835927-C498-5EF5-34D1-134A7B948E07}"/>
+                </a:ext>
+              </a:extLst>
+            </p:cNvPr>
             <p:cNvSpPr/>
             <p:nvPr/>
           </p:nvSpPr>
@@ -9448,7 +9560,13 @@
         </p:sp>
         <p:sp>
           <p:nvSpPr>
-            <p:cNvPr id="403" name="Google Shape;403;p23"/>
+            <p:cNvPr id="41" name="Google Shape;403;p23">
+              <a:extLst>
+                <a:ext uri="{FF2B5EF4-FFF2-40B4-BE49-F238E27FC236}">
+                  <a16:creationId xmlns:a16="http://schemas.microsoft.com/office/drawing/2014/main" id="{4CDB4567-EC9D-2439-73CC-27B6A1B55CB7}"/>
+                </a:ext>
+              </a:extLst>
+            </p:cNvPr>
             <p:cNvSpPr/>
             <p:nvPr/>
           </p:nvSpPr>
@@ -9558,7 +9676,13 @@
         </p:sp>
         <p:sp>
           <p:nvSpPr>
-            <p:cNvPr id="404" name="Google Shape;404;p23"/>
+            <p:cNvPr id="42" name="Google Shape;404;p23">
+              <a:extLst>
+                <a:ext uri="{FF2B5EF4-FFF2-40B4-BE49-F238E27FC236}">
+                  <a16:creationId xmlns:a16="http://schemas.microsoft.com/office/drawing/2014/main" id="{CF118257-2502-0AF0-F418-A734DB7FDC71}"/>
+                </a:ext>
+              </a:extLst>
+            </p:cNvPr>
             <p:cNvSpPr/>
             <p:nvPr/>
           </p:nvSpPr>
@@ -9633,7 +9757,13 @@
         </p:sp>
         <p:sp>
           <p:nvSpPr>
-            <p:cNvPr id="405" name="Google Shape;405;p23"/>
+            <p:cNvPr id="43" name="Google Shape;405;p23">
+              <a:extLst>
+                <a:ext uri="{FF2B5EF4-FFF2-40B4-BE49-F238E27FC236}">
+                  <a16:creationId xmlns:a16="http://schemas.microsoft.com/office/drawing/2014/main" id="{1AC5B6F1-0A58-2972-800C-1FBCE94D3A0A}"/>
+                </a:ext>
+              </a:extLst>
+            </p:cNvPr>
             <p:cNvSpPr/>
             <p:nvPr/>
           </p:nvSpPr>
@@ -9708,7 +9838,13 @@
         </p:sp>
         <p:sp>
           <p:nvSpPr>
-            <p:cNvPr id="406" name="Google Shape;406;p23"/>
+            <p:cNvPr id="44" name="Google Shape;406;p23">
+              <a:extLst>
+                <a:ext uri="{FF2B5EF4-FFF2-40B4-BE49-F238E27FC236}">
+                  <a16:creationId xmlns:a16="http://schemas.microsoft.com/office/drawing/2014/main" id="{672E3801-F669-9308-0F84-68A542651B59}"/>
+                </a:ext>
+              </a:extLst>
+            </p:cNvPr>
             <p:cNvSpPr/>
             <p:nvPr/>
           </p:nvSpPr>
@@ -9783,7 +9919,13 @@
         </p:sp>
         <p:sp>
           <p:nvSpPr>
-            <p:cNvPr id="407" name="Google Shape;407;p23"/>
+            <p:cNvPr id="45" name="Google Shape;407;p23">
+              <a:extLst>
+                <a:ext uri="{FF2B5EF4-FFF2-40B4-BE49-F238E27FC236}">
+                  <a16:creationId xmlns:a16="http://schemas.microsoft.com/office/drawing/2014/main" id="{0CB4F0C7-12DA-47DE-30D7-7361A5CF4CB0}"/>
+                </a:ext>
+              </a:extLst>
+            </p:cNvPr>
             <p:cNvSpPr/>
             <p:nvPr/>
           </p:nvSpPr>
@@ -9895,7 +10037,13 @@
         </p:sp>
         <p:sp>
           <p:nvSpPr>
-            <p:cNvPr id="408" name="Google Shape;408;p23"/>
+            <p:cNvPr id="46" name="Google Shape;408;p23">
+              <a:extLst>
+                <a:ext uri="{FF2B5EF4-FFF2-40B4-BE49-F238E27FC236}">
+                  <a16:creationId xmlns:a16="http://schemas.microsoft.com/office/drawing/2014/main" id="{CF150C11-6341-AF2D-DC07-82ABADDEEA3F}"/>
+                </a:ext>
+              </a:extLst>
+            </p:cNvPr>
             <p:cNvSpPr/>
             <p:nvPr/>
           </p:nvSpPr>
@@ -9968,7 +10116,13 @@
       </p:grpSp>
       <p:grpSp>
         <p:nvGrpSpPr>
-          <p:cNvPr id="409" name="Google Shape;409;p23"/>
+          <p:cNvPr id="47" name="Google Shape;409;p23">
+            <a:extLst>
+              <a:ext uri="{FF2B5EF4-FFF2-40B4-BE49-F238E27FC236}">
+                <a16:creationId xmlns:a16="http://schemas.microsoft.com/office/drawing/2014/main" id="{20B10F7C-9DCF-314A-00B7-A6B54DF00FC4}"/>
+              </a:ext>
+            </a:extLst>
+          </p:cNvPr>
           <p:cNvGrpSpPr/>
           <p:nvPr/>
         </p:nvGrpSpPr>
@@ -9982,7 +10136,13 @@
         </p:grpSpPr>
         <p:sp>
           <p:nvSpPr>
-            <p:cNvPr id="410" name="Google Shape;410;p23"/>
+            <p:cNvPr id="48" name="Google Shape;410;p23">
+              <a:extLst>
+                <a:ext uri="{FF2B5EF4-FFF2-40B4-BE49-F238E27FC236}">
+                  <a16:creationId xmlns:a16="http://schemas.microsoft.com/office/drawing/2014/main" id="{5B0B79F5-ADE2-B204-7A0E-9F3D22773F3E}"/>
+                </a:ext>
+              </a:extLst>
+            </p:cNvPr>
             <p:cNvSpPr/>
             <p:nvPr/>
           </p:nvSpPr>
@@ -10133,7 +10293,13 @@
         </p:sp>
         <p:sp>
           <p:nvSpPr>
-            <p:cNvPr id="411" name="Google Shape;411;p23"/>
+            <p:cNvPr id="49" name="Google Shape;411;p23">
+              <a:extLst>
+                <a:ext uri="{FF2B5EF4-FFF2-40B4-BE49-F238E27FC236}">
+                  <a16:creationId xmlns:a16="http://schemas.microsoft.com/office/drawing/2014/main" id="{712BD049-D94A-AB74-BD6B-F6E7A3E5B890}"/>
+                </a:ext>
+              </a:extLst>
+            </p:cNvPr>
             <p:cNvSpPr/>
             <p:nvPr/>
           </p:nvSpPr>
@@ -10285,7 +10451,13 @@
         </p:sp>
         <p:sp>
           <p:nvSpPr>
-            <p:cNvPr id="412" name="Google Shape;412;p23"/>
+            <p:cNvPr id="50" name="Google Shape;412;p23">
+              <a:extLst>
+                <a:ext uri="{FF2B5EF4-FFF2-40B4-BE49-F238E27FC236}">
+                  <a16:creationId xmlns:a16="http://schemas.microsoft.com/office/drawing/2014/main" id="{B00747A0-23B9-8421-E481-7F2B612BB2CF}"/>
+                </a:ext>
+              </a:extLst>
+            </p:cNvPr>
             <p:cNvSpPr/>
             <p:nvPr/>
           </p:nvSpPr>
@@ -10363,7 +10535,13 @@
         </p:sp>
         <p:sp>
           <p:nvSpPr>
-            <p:cNvPr id="413" name="Google Shape;413;p23"/>
+            <p:cNvPr id="51" name="Google Shape;413;p23">
+              <a:extLst>
+                <a:ext uri="{FF2B5EF4-FFF2-40B4-BE49-F238E27FC236}">
+                  <a16:creationId xmlns:a16="http://schemas.microsoft.com/office/drawing/2014/main" id="{ED46577D-2764-7193-EAED-C10EFA571922}"/>
+                </a:ext>
+              </a:extLst>
+            </p:cNvPr>
             <p:cNvSpPr/>
             <p:nvPr/>
           </p:nvSpPr>
@@ -10446,7 +10624,13 @@
         </p:sp>
         <p:sp>
           <p:nvSpPr>
-            <p:cNvPr id="414" name="Google Shape;414;p23"/>
+            <p:cNvPr id="52" name="Google Shape;414;p23">
+              <a:extLst>
+                <a:ext uri="{FF2B5EF4-FFF2-40B4-BE49-F238E27FC236}">
+                  <a16:creationId xmlns:a16="http://schemas.microsoft.com/office/drawing/2014/main" id="{5C868384-124D-7F3F-9993-ED2B66C2879B}"/>
+                </a:ext>
+              </a:extLst>
+            </p:cNvPr>
             <p:cNvSpPr/>
             <p:nvPr/>
           </p:nvSpPr>
@@ -10518,7 +10702,13 @@
         </p:sp>
         <p:sp>
           <p:nvSpPr>
-            <p:cNvPr id="415" name="Google Shape;415;p23"/>
+            <p:cNvPr id="53" name="Google Shape;415;p23">
+              <a:extLst>
+                <a:ext uri="{FF2B5EF4-FFF2-40B4-BE49-F238E27FC236}">
+                  <a16:creationId xmlns:a16="http://schemas.microsoft.com/office/drawing/2014/main" id="{9CF24461-BA5A-C762-EE30-914841B8EA67}"/>
+                </a:ext>
+              </a:extLst>
+            </p:cNvPr>
             <p:cNvSpPr/>
             <p:nvPr/>
           </p:nvSpPr>
@@ -10598,7 +10788,13 @@
       </p:grpSp>
       <p:grpSp>
         <p:nvGrpSpPr>
-          <p:cNvPr id="416" name="Google Shape;416;p23"/>
+          <p:cNvPr id="54" name="Google Shape;416;p23">
+            <a:extLst>
+              <a:ext uri="{FF2B5EF4-FFF2-40B4-BE49-F238E27FC236}">
+                <a16:creationId xmlns:a16="http://schemas.microsoft.com/office/drawing/2014/main" id="{FCFCE5E0-8128-4D7F-1A9F-FDE09ABFCB79}"/>
+              </a:ext>
+            </a:extLst>
+          </p:cNvPr>
           <p:cNvGrpSpPr/>
           <p:nvPr/>
         </p:nvGrpSpPr>
@@ -10612,7 +10808,13 @@
         </p:grpSpPr>
         <p:sp>
           <p:nvSpPr>
-            <p:cNvPr id="417" name="Google Shape;417;p23"/>
+            <p:cNvPr id="55" name="Google Shape;417;p23">
+              <a:extLst>
+                <a:ext uri="{FF2B5EF4-FFF2-40B4-BE49-F238E27FC236}">
+                  <a16:creationId xmlns:a16="http://schemas.microsoft.com/office/drawing/2014/main" id="{BF6EDDD0-1241-CD7E-A3A9-FF522313885F}"/>
+                </a:ext>
+              </a:extLst>
+            </p:cNvPr>
             <p:cNvSpPr/>
             <p:nvPr/>
           </p:nvSpPr>
@@ -10725,7 +10927,13 @@
         </p:sp>
         <p:sp>
           <p:nvSpPr>
-            <p:cNvPr id="418" name="Google Shape;418;p23"/>
+            <p:cNvPr id="56" name="Google Shape;418;p23">
+              <a:extLst>
+                <a:ext uri="{FF2B5EF4-FFF2-40B4-BE49-F238E27FC236}">
+                  <a16:creationId xmlns:a16="http://schemas.microsoft.com/office/drawing/2014/main" id="{FF9F631D-FABD-611D-2748-4477747734A0}"/>
+                </a:ext>
+              </a:extLst>
+            </p:cNvPr>
             <p:cNvSpPr/>
             <p:nvPr/>
           </p:nvSpPr>
@@ -10801,7 +11009,13 @@
         </p:sp>
         <p:sp>
           <p:nvSpPr>
-            <p:cNvPr id="419" name="Google Shape;419;p23"/>
+            <p:cNvPr id="57" name="Google Shape;419;p23">
+              <a:extLst>
+                <a:ext uri="{FF2B5EF4-FFF2-40B4-BE49-F238E27FC236}">
+                  <a16:creationId xmlns:a16="http://schemas.microsoft.com/office/drawing/2014/main" id="{F6612030-B9C0-5170-CA9D-E0564B91F669}"/>
+                </a:ext>
+              </a:extLst>
+            </p:cNvPr>
             <p:cNvSpPr/>
             <p:nvPr/>
           </p:nvSpPr>
@@ -10872,7 +11086,13 @@
         </p:sp>
         <p:sp>
           <p:nvSpPr>
-            <p:cNvPr id="420" name="Google Shape;420;p23"/>
+            <p:cNvPr id="58" name="Google Shape;420;p23">
+              <a:extLst>
+                <a:ext uri="{FF2B5EF4-FFF2-40B4-BE49-F238E27FC236}">
+                  <a16:creationId xmlns:a16="http://schemas.microsoft.com/office/drawing/2014/main" id="{F6D2D308-FBDF-970D-0A2B-60B36DE15A53}"/>
+                </a:ext>
+              </a:extLst>
+            </p:cNvPr>
             <p:cNvSpPr/>
             <p:nvPr/>
           </p:nvSpPr>
@@ -10944,7 +11164,13 @@
         </p:sp>
         <p:sp>
           <p:nvSpPr>
-            <p:cNvPr id="421" name="Google Shape;421;p23"/>
+            <p:cNvPr id="59" name="Google Shape;421;p23">
+              <a:extLst>
+                <a:ext uri="{FF2B5EF4-FFF2-40B4-BE49-F238E27FC236}">
+                  <a16:creationId xmlns:a16="http://schemas.microsoft.com/office/drawing/2014/main" id="{8488770A-4CB5-CCC7-FF6E-8313B2169AB5}"/>
+                </a:ext>
+              </a:extLst>
+            </p:cNvPr>
             <p:cNvSpPr/>
             <p:nvPr/>
           </p:nvSpPr>
@@ -11031,7 +11257,13 @@
       </p:grpSp>
       <p:grpSp>
         <p:nvGrpSpPr>
-          <p:cNvPr id="422" name="Google Shape;422;p23"/>
+          <p:cNvPr id="60" name="Google Shape;422;p23">
+            <a:extLst>
+              <a:ext uri="{FF2B5EF4-FFF2-40B4-BE49-F238E27FC236}">
+                <a16:creationId xmlns:a16="http://schemas.microsoft.com/office/drawing/2014/main" id="{CC9DB127-D412-3260-725A-4824E4D89656}"/>
+              </a:ext>
+            </a:extLst>
+          </p:cNvPr>
           <p:cNvGrpSpPr/>
           <p:nvPr/>
         </p:nvGrpSpPr>
@@ -11045,7 +11277,13 @@
         </p:grpSpPr>
         <p:sp>
           <p:nvSpPr>
-            <p:cNvPr id="423" name="Google Shape;423;p23"/>
+            <p:cNvPr id="61" name="Google Shape;423;p23">
+              <a:extLst>
+                <a:ext uri="{FF2B5EF4-FFF2-40B4-BE49-F238E27FC236}">
+                  <a16:creationId xmlns:a16="http://schemas.microsoft.com/office/drawing/2014/main" id="{E999CDF4-6104-A68E-9368-211B08BBC36E}"/>
+                </a:ext>
+              </a:extLst>
+            </p:cNvPr>
             <p:cNvSpPr/>
             <p:nvPr/>
           </p:nvSpPr>
@@ -11150,7 +11388,13 @@
         </p:sp>
         <p:sp>
           <p:nvSpPr>
-            <p:cNvPr id="424" name="Google Shape;424;p23"/>
+            <p:cNvPr id="62" name="Google Shape;424;p23">
+              <a:extLst>
+                <a:ext uri="{FF2B5EF4-FFF2-40B4-BE49-F238E27FC236}">
+                  <a16:creationId xmlns:a16="http://schemas.microsoft.com/office/drawing/2014/main" id="{639A4F70-C540-7951-0DE4-87DC71D7453A}"/>
+                </a:ext>
+              </a:extLst>
+            </p:cNvPr>
             <p:cNvSpPr/>
             <p:nvPr/>
           </p:nvSpPr>
@@ -11255,7 +11499,13 @@
         </p:sp>
         <p:sp>
           <p:nvSpPr>
-            <p:cNvPr id="425" name="Google Shape;425;p23"/>
+            <p:cNvPr id="63" name="Google Shape;425;p23">
+              <a:extLst>
+                <a:ext uri="{FF2B5EF4-FFF2-40B4-BE49-F238E27FC236}">
+                  <a16:creationId xmlns:a16="http://schemas.microsoft.com/office/drawing/2014/main" id="{A4F6764A-D23B-408A-BED3-5A7568A05D0A}"/>
+                </a:ext>
+              </a:extLst>
+            </p:cNvPr>
             <p:cNvSpPr/>
             <p:nvPr/>
           </p:nvSpPr>
@@ -11326,7 +11576,13 @@
         </p:sp>
         <p:sp>
           <p:nvSpPr>
-            <p:cNvPr id="426" name="Google Shape;426;p23"/>
+            <p:cNvPr id="64" name="Google Shape;426;p23">
+              <a:extLst>
+                <a:ext uri="{FF2B5EF4-FFF2-40B4-BE49-F238E27FC236}">
+                  <a16:creationId xmlns:a16="http://schemas.microsoft.com/office/drawing/2014/main" id="{C87603B5-4419-9EFA-4523-45769AC1DBCB}"/>
+                </a:ext>
+              </a:extLst>
+            </p:cNvPr>
             <p:cNvSpPr/>
             <p:nvPr/>
           </p:nvSpPr>
@@ -11397,7 +11653,13 @@
         </p:sp>
         <p:sp>
           <p:nvSpPr>
-            <p:cNvPr id="427" name="Google Shape;427;p23"/>
+            <p:cNvPr id="65" name="Google Shape;427;p23">
+              <a:extLst>
+                <a:ext uri="{FF2B5EF4-FFF2-40B4-BE49-F238E27FC236}">
+                  <a16:creationId xmlns:a16="http://schemas.microsoft.com/office/drawing/2014/main" id="{F5100F72-B705-69BE-01F1-3D26658192D6}"/>
+                </a:ext>
+              </a:extLst>
+            </p:cNvPr>
             <p:cNvSpPr/>
             <p:nvPr/>
           </p:nvSpPr>
@@ -11527,10 +11789,10 @@
       </p:grpSp>
       <p:sp>
         <p:nvSpPr>
-          <p:cNvPr id="3" name="Google Shape;384;p23">
+          <p:cNvPr id="66" name="Google Shape;384;p23">
             <a:extLst>
               <a:ext uri="{FF2B5EF4-FFF2-40B4-BE49-F238E27FC236}">
-                <a16:creationId xmlns:a16="http://schemas.microsoft.com/office/drawing/2014/main" id="{474419F3-0B9C-B579-E27B-D392C0B205CF}"/>
+                <a16:creationId xmlns:a16="http://schemas.microsoft.com/office/drawing/2014/main" id="{43A0C5F9-ADD7-52B3-0EA0-3F661C67AD9C}"/>
               </a:ext>
             </a:extLst>
           </p:cNvPr>
@@ -11580,10 +11842,10 @@
       </p:sp>
       <p:sp>
         <p:nvSpPr>
-          <p:cNvPr id="4" name="Google Shape;390;p23">
+          <p:cNvPr id="67" name="Google Shape;390;p23">
             <a:extLst>
               <a:ext uri="{FF2B5EF4-FFF2-40B4-BE49-F238E27FC236}">
-                <a16:creationId xmlns:a16="http://schemas.microsoft.com/office/drawing/2014/main" id="{F6196B06-0D46-91E4-1813-97986007638C}"/>
+                <a16:creationId xmlns:a16="http://schemas.microsoft.com/office/drawing/2014/main" id="{E298DFE8-2D75-DDDE-C19C-4C6F800EFA76}"/>
               </a:ext>
             </a:extLst>
           </p:cNvPr>
@@ -11644,10 +11906,10 @@
       </p:sp>
       <p:sp>
         <p:nvSpPr>
-          <p:cNvPr id="5" name="Google Shape;391;p23">
+          <p:cNvPr id="68" name="Google Shape;391;p23">
             <a:extLst>
               <a:ext uri="{FF2B5EF4-FFF2-40B4-BE49-F238E27FC236}">
-                <a16:creationId xmlns:a16="http://schemas.microsoft.com/office/drawing/2014/main" id="{0F515CAC-D44F-DEE8-6A2F-BB28F3B5F5C6}"/>
+                <a16:creationId xmlns:a16="http://schemas.microsoft.com/office/drawing/2014/main" id="{9D986084-5794-CAE8-0ADB-EB75745FD786}"/>
               </a:ext>
             </a:extLst>
           </p:cNvPr>
@@ -11729,10 +11991,10 @@
       </p:sp>
       <p:grpSp>
         <p:nvGrpSpPr>
-          <p:cNvPr id="6" name="Google Shape;351;p22">
+          <p:cNvPr id="69" name="Google Shape;351;p22">
             <a:extLst>
               <a:ext uri="{FF2B5EF4-FFF2-40B4-BE49-F238E27FC236}">
-                <a16:creationId xmlns:a16="http://schemas.microsoft.com/office/drawing/2014/main" id="{FE7E84D6-2635-6CCB-1C33-01446F762123}"/>
+                <a16:creationId xmlns:a16="http://schemas.microsoft.com/office/drawing/2014/main" id="{37C24403-90FB-C3CF-108F-B065B534124D}"/>
               </a:ext>
             </a:extLst>
           </p:cNvPr>
@@ -11749,10 +12011,10 @@
         </p:grpSpPr>
         <p:sp>
           <p:nvSpPr>
-            <p:cNvPr id="7" name="Google Shape;352;p22">
+            <p:cNvPr id="70" name="Google Shape;352;p22">
               <a:extLst>
                 <a:ext uri="{FF2B5EF4-FFF2-40B4-BE49-F238E27FC236}">
-                  <a16:creationId xmlns:a16="http://schemas.microsoft.com/office/drawing/2014/main" id="{C13F8086-8CBF-1BA0-92B2-2B50E0A9E242}"/>
+                  <a16:creationId xmlns:a16="http://schemas.microsoft.com/office/drawing/2014/main" id="{EC00CD96-4BFE-9F23-3506-CB6400676254}"/>
                 </a:ext>
               </a:extLst>
             </p:cNvPr>
@@ -11843,10 +12105,10 @@
         </p:sp>
         <p:sp>
           <p:nvSpPr>
-            <p:cNvPr id="8" name="Google Shape;353;p22">
+            <p:cNvPr id="71" name="Google Shape;353;p22">
               <a:extLst>
                 <a:ext uri="{FF2B5EF4-FFF2-40B4-BE49-F238E27FC236}">
-                  <a16:creationId xmlns:a16="http://schemas.microsoft.com/office/drawing/2014/main" id="{99D65050-4349-03CB-A717-C1BC8F352E3A}"/>
+                  <a16:creationId xmlns:a16="http://schemas.microsoft.com/office/drawing/2014/main" id="{D909E461-6C5E-65FE-0175-46BBE5B61915}"/>
                 </a:ext>
               </a:extLst>
             </p:cNvPr>
@@ -11937,10 +12199,10 @@
         </p:sp>
         <p:sp>
           <p:nvSpPr>
-            <p:cNvPr id="9" name="Google Shape;354;p22">
+            <p:cNvPr id="72" name="Google Shape;354;p22">
               <a:extLst>
                 <a:ext uri="{FF2B5EF4-FFF2-40B4-BE49-F238E27FC236}">
-                  <a16:creationId xmlns:a16="http://schemas.microsoft.com/office/drawing/2014/main" id="{FEEE36C4-EDC5-343F-397E-BCBD1A9D205F}"/>
+                  <a16:creationId xmlns:a16="http://schemas.microsoft.com/office/drawing/2014/main" id="{D2EE2FAA-F2E4-04A9-902B-38FA5A58FF7B}"/>
                 </a:ext>
               </a:extLst>
             </p:cNvPr>
@@ -12031,10 +12293,10 @@
         </p:sp>
         <p:sp>
           <p:nvSpPr>
-            <p:cNvPr id="10" name="Google Shape;355;p22">
+            <p:cNvPr id="73" name="Google Shape;355;p22">
               <a:extLst>
                 <a:ext uri="{FF2B5EF4-FFF2-40B4-BE49-F238E27FC236}">
-                  <a16:creationId xmlns:a16="http://schemas.microsoft.com/office/drawing/2014/main" id="{C560815A-8156-09FF-8400-42F6396B285A}"/>
+                  <a16:creationId xmlns:a16="http://schemas.microsoft.com/office/drawing/2014/main" id="{B3AC1713-A8E9-9995-DAC3-05D960EAD59D}"/>
                 </a:ext>
               </a:extLst>
             </p:cNvPr>
@@ -12125,10 +12387,10 @@
         </p:sp>
         <p:sp>
           <p:nvSpPr>
-            <p:cNvPr id="11" name="Google Shape;356;p22">
+            <p:cNvPr id="74" name="Google Shape;356;p22">
               <a:extLst>
                 <a:ext uri="{FF2B5EF4-FFF2-40B4-BE49-F238E27FC236}">
-                  <a16:creationId xmlns:a16="http://schemas.microsoft.com/office/drawing/2014/main" id="{C952FEBB-A070-9E87-DE18-77AB4AF4BD21}"/>
+                  <a16:creationId xmlns:a16="http://schemas.microsoft.com/office/drawing/2014/main" id="{3D91FF3C-A1E5-00CE-0C13-6084D1DE8A80}"/>
                 </a:ext>
               </a:extLst>
             </p:cNvPr>
@@ -12210,10 +12472,10 @@
         </p:sp>
         <p:sp>
           <p:nvSpPr>
-            <p:cNvPr id="12" name="Google Shape;357;p22">
+            <p:cNvPr id="75" name="Google Shape;357;p22">
               <a:extLst>
                 <a:ext uri="{FF2B5EF4-FFF2-40B4-BE49-F238E27FC236}">
-                  <a16:creationId xmlns:a16="http://schemas.microsoft.com/office/drawing/2014/main" id="{2D4864FD-E917-AFCA-B03F-F09FF17871BD}"/>
+                  <a16:creationId xmlns:a16="http://schemas.microsoft.com/office/drawing/2014/main" id="{AC9E0C50-4AC2-ECF4-4DEE-F41D99CD47CD}"/>
                 </a:ext>
               </a:extLst>
             </p:cNvPr>
@@ -12470,10 +12732,10 @@
         </p:sp>
         <p:sp>
           <p:nvSpPr>
-            <p:cNvPr id="13" name="Google Shape;358;p22">
+            <p:cNvPr id="76" name="Google Shape;358;p22">
               <a:extLst>
                 <a:ext uri="{FF2B5EF4-FFF2-40B4-BE49-F238E27FC236}">
-                  <a16:creationId xmlns:a16="http://schemas.microsoft.com/office/drawing/2014/main" id="{930BF85E-E6C1-7D38-4E45-F2AB28E18328}"/>
+                  <a16:creationId xmlns:a16="http://schemas.microsoft.com/office/drawing/2014/main" id="{62BD0132-F135-4237-58E0-4FC04775A8AA}"/>
                 </a:ext>
               </a:extLst>
             </p:cNvPr>
@@ -12589,6 +12851,11 @@
         </p:sp>
       </p:grpSp>
     </p:spTree>
+    <p:extLst>
+      <p:ext uri="{BB962C8B-B14F-4D97-AF65-F5344CB8AC3E}">
+        <p14:creationId xmlns:p14="http://schemas.microsoft.com/office/powerpoint/2010/main" val="1133922546"/>
+      </p:ext>
+    </p:extLst>
   </p:cSld>
   <p:clrMapOvr>
     <a:masterClrMapping/>

</xml_diff>